<commit_message>
[LAB7] Updated slides with Entity vs Value Object and C# Immutable Types
</commit_message>
<xml_diff>
--- a/LAB7/DDD.pptx
+++ b/LAB7/DDD.pptx
@@ -282,7 +282,7 @@
           <a:p>
             <a:fld id="{C3AEF51C-C8F2-4102-8619-219165FABFC5}" type="datetimeFigureOut">
               <a:rPr lang="en-US" smtClean="0"/>
-              <a:t>11/7/2019</a:t>
+              <a:t>11/21/2019</a:t>
             </a:fld>
             <a:endParaRPr lang="en-US"/>
           </a:p>
@@ -482,7 +482,7 @@
           <a:p>
             <a:fld id="{C3AEF51C-C8F2-4102-8619-219165FABFC5}" type="datetimeFigureOut">
               <a:rPr lang="en-US" smtClean="0"/>
-              <a:t>11/7/2019</a:t>
+              <a:t>11/21/2019</a:t>
             </a:fld>
             <a:endParaRPr lang="en-US"/>
           </a:p>
@@ -692,7 +692,7 @@
           <a:p>
             <a:fld id="{C3AEF51C-C8F2-4102-8619-219165FABFC5}" type="datetimeFigureOut">
               <a:rPr lang="en-US" smtClean="0"/>
-              <a:t>11/7/2019</a:t>
+              <a:t>11/21/2019</a:t>
             </a:fld>
             <a:endParaRPr lang="en-US"/>
           </a:p>
@@ -892,7 +892,7 @@
           <a:p>
             <a:fld id="{C3AEF51C-C8F2-4102-8619-219165FABFC5}" type="datetimeFigureOut">
               <a:rPr lang="en-US" smtClean="0"/>
-              <a:t>11/7/2019</a:t>
+              <a:t>11/21/2019</a:t>
             </a:fld>
             <a:endParaRPr lang="en-US"/>
           </a:p>
@@ -1168,7 +1168,7 @@
           <a:p>
             <a:fld id="{C3AEF51C-C8F2-4102-8619-219165FABFC5}" type="datetimeFigureOut">
               <a:rPr lang="en-US" smtClean="0"/>
-              <a:t>11/7/2019</a:t>
+              <a:t>11/21/2019</a:t>
             </a:fld>
             <a:endParaRPr lang="en-US"/>
           </a:p>
@@ -1436,7 +1436,7 @@
           <a:p>
             <a:fld id="{C3AEF51C-C8F2-4102-8619-219165FABFC5}" type="datetimeFigureOut">
               <a:rPr lang="en-US" smtClean="0"/>
-              <a:t>11/7/2019</a:t>
+              <a:t>11/21/2019</a:t>
             </a:fld>
             <a:endParaRPr lang="en-US"/>
           </a:p>
@@ -1851,7 +1851,7 @@
           <a:p>
             <a:fld id="{C3AEF51C-C8F2-4102-8619-219165FABFC5}" type="datetimeFigureOut">
               <a:rPr lang="en-US" smtClean="0"/>
-              <a:t>11/7/2019</a:t>
+              <a:t>11/21/2019</a:t>
             </a:fld>
             <a:endParaRPr lang="en-US"/>
           </a:p>
@@ -1993,7 +1993,7 @@
           <a:p>
             <a:fld id="{C3AEF51C-C8F2-4102-8619-219165FABFC5}" type="datetimeFigureOut">
               <a:rPr lang="en-US" smtClean="0"/>
-              <a:t>11/7/2019</a:t>
+              <a:t>11/21/2019</a:t>
             </a:fld>
             <a:endParaRPr lang="en-US"/>
           </a:p>
@@ -2106,7 +2106,7 @@
           <a:p>
             <a:fld id="{C3AEF51C-C8F2-4102-8619-219165FABFC5}" type="datetimeFigureOut">
               <a:rPr lang="en-US" smtClean="0"/>
-              <a:t>11/7/2019</a:t>
+              <a:t>11/21/2019</a:t>
             </a:fld>
             <a:endParaRPr lang="en-US"/>
           </a:p>
@@ -2419,7 +2419,7 @@
           <a:p>
             <a:fld id="{C3AEF51C-C8F2-4102-8619-219165FABFC5}" type="datetimeFigureOut">
               <a:rPr lang="en-US" smtClean="0"/>
-              <a:t>11/7/2019</a:t>
+              <a:t>11/21/2019</a:t>
             </a:fld>
             <a:endParaRPr lang="en-US"/>
           </a:p>
@@ -2708,7 +2708,7 @@
           <a:p>
             <a:fld id="{C3AEF51C-C8F2-4102-8619-219165FABFC5}" type="datetimeFigureOut">
               <a:rPr lang="en-US" smtClean="0"/>
-              <a:t>11/7/2019</a:t>
+              <a:t>11/21/2019</a:t>
             </a:fld>
             <a:endParaRPr lang="en-US"/>
           </a:p>
@@ -2951,7 +2951,7 @@
           <a:p>
             <a:fld id="{C3AEF51C-C8F2-4102-8619-219165FABFC5}" type="datetimeFigureOut">
               <a:rPr lang="en-US" smtClean="0"/>
-              <a:t>11/7/2019</a:t>
+              <a:t>11/21/2019</a:t>
             </a:fld>
             <a:endParaRPr lang="en-US"/>
           </a:p>
@@ -5956,9 +5956,16 @@
             <p:ph idx="1"/>
           </p:nvPr>
         </p:nvSpPr>
-        <p:spPr/>
-        <p:txBody>
-          <a:bodyPr/>
+        <p:spPr>
+          <a:xfrm>
+            <a:off x="838200" y="1825624"/>
+            <a:ext cx="10515600" cy="4876833"/>
+          </a:xfrm>
+        </p:spPr>
+        <p:txBody>
+          <a:bodyPr>
+            <a:normAutofit lnSpcReduction="10000"/>
+          </a:bodyPr>
           <a:lstStyle/>
           <a:p>
             <a:r>
@@ -6066,91 +6073,143 @@
               <a:rPr lang="en-US" dirty="0" err="1"/>
               <a:t>modifică</a:t>
             </a:r>
+            <a:r>
+              <a:rPr lang="en-US" dirty="0"/>
+              <a:t> (</a:t>
+            </a:r>
+            <a:r>
+              <a:rPr lang="en-US" dirty="0">
+                <a:hlinkClick r:id="rId2"/>
+              </a:rPr>
+              <a:t>https://blog.ndepend.com/c-sharp-immutable-types-understanding-attraction</a:t>
+            </a:r>
+            <a:r>
+              <a:rPr lang="en-US" dirty="0"/>
+              <a:t>)</a:t>
+            </a:r>
+          </a:p>
+          <a:p>
+            <a:r>
+              <a:rPr lang="en-US" dirty="0" err="1"/>
+              <a:t>interogarea</a:t>
+            </a:r>
+            <a:r>
+              <a:rPr lang="en-US" dirty="0"/>
+              <a:t> </a:t>
+            </a:r>
+            <a:r>
+              <a:rPr lang="en-US" dirty="0" err="1"/>
+              <a:t>modelului</a:t>
+            </a:r>
+            <a:r>
+              <a:rPr lang="en-US" dirty="0"/>
+              <a:t> </a:t>
+            </a:r>
+            <a:r>
+              <a:rPr lang="en-US" dirty="0" err="1"/>
+              <a:t>ar</a:t>
+            </a:r>
+            <a:r>
+              <a:rPr lang="en-US" dirty="0"/>
+              <a:t> </a:t>
+            </a:r>
+            <a:r>
+              <a:rPr lang="en-US" dirty="0" err="1"/>
+              <a:t>trebui</a:t>
+            </a:r>
+            <a:r>
+              <a:rPr lang="en-US" dirty="0"/>
+              <a:t> </a:t>
+            </a:r>
+            <a:r>
+              <a:rPr lang="en-US" dirty="0" err="1"/>
+              <a:t>să</a:t>
+            </a:r>
+            <a:r>
+              <a:rPr lang="en-US" dirty="0"/>
+              <a:t> </a:t>
+            </a:r>
+            <a:r>
+              <a:rPr lang="en-US" dirty="0" err="1"/>
+              <a:t>returneze</a:t>
+            </a:r>
+            <a:r>
+              <a:rPr lang="en-US" dirty="0"/>
+              <a:t> </a:t>
+            </a:r>
+            <a:r>
+              <a:rPr lang="en-US" dirty="0" err="1"/>
+              <a:t>doar</a:t>
+            </a:r>
+            <a:r>
+              <a:rPr lang="en-US" dirty="0"/>
+              <a:t> </a:t>
+            </a:r>
+            <a:r>
+              <a:rPr lang="en-US" dirty="0" err="1"/>
+              <a:t>astfel</a:t>
+            </a:r>
+            <a:r>
+              <a:rPr lang="en-US" dirty="0"/>
+              <a:t> de </a:t>
+            </a:r>
+            <a:r>
+              <a:rPr lang="en-US" dirty="0" err="1"/>
+              <a:t>obiecte</a:t>
+            </a:r>
             <a:endParaRPr lang="en-US" dirty="0"/>
           </a:p>
           <a:p>
-            <a:r>
-              <a:rPr lang="en-US" dirty="0" err="1"/>
-              <a:t>interogarea</a:t>
-            </a:r>
-            <a:r>
-              <a:rPr lang="en-US" dirty="0"/>
-              <a:t> </a:t>
-            </a:r>
-            <a:r>
-              <a:rPr lang="en-US" dirty="0" err="1"/>
-              <a:t>modelului</a:t>
-            </a:r>
-            <a:r>
-              <a:rPr lang="en-US" dirty="0"/>
-              <a:t> </a:t>
-            </a:r>
-            <a:r>
-              <a:rPr lang="en-US" dirty="0" err="1"/>
-              <a:t>ar</a:t>
-            </a:r>
-            <a:r>
-              <a:rPr lang="en-US" dirty="0"/>
-              <a:t> </a:t>
-            </a:r>
-            <a:r>
-              <a:rPr lang="en-US" dirty="0" err="1"/>
-              <a:t>trebui</a:t>
-            </a:r>
-            <a:r>
-              <a:rPr lang="en-US" dirty="0"/>
-              <a:t> </a:t>
-            </a:r>
-            <a:r>
-              <a:rPr lang="en-US" dirty="0" err="1"/>
-              <a:t>să</a:t>
-            </a:r>
-            <a:r>
-              <a:rPr lang="en-US" dirty="0"/>
-              <a:t> </a:t>
-            </a:r>
-            <a:r>
-              <a:rPr lang="en-US" dirty="0" err="1"/>
-              <a:t>returneze</a:t>
-            </a:r>
-            <a:r>
-              <a:rPr lang="en-US" dirty="0"/>
-              <a:t> </a:t>
-            </a:r>
-            <a:r>
-              <a:rPr lang="en-US" dirty="0" err="1"/>
-              <a:t>doar</a:t>
-            </a:r>
-            <a:r>
-              <a:rPr lang="en-US" dirty="0"/>
-              <a:t> </a:t>
-            </a:r>
-            <a:r>
-              <a:rPr lang="en-US" dirty="0" err="1"/>
-              <a:t>astfel</a:t>
-            </a:r>
-            <a:r>
-              <a:rPr lang="en-US" dirty="0"/>
-              <a:t> de </a:t>
-            </a:r>
-            <a:r>
-              <a:rPr lang="en-US" dirty="0" err="1"/>
-              <a:t>obiecte</a:t>
-            </a:r>
             <a:endParaRPr lang="en-US" dirty="0"/>
           </a:p>
           <a:p>
+            <a:r>
+              <a:rPr lang="en-US" dirty="0" err="1"/>
+              <a:t>Exemplu</a:t>
+            </a:r>
+            <a:r>
+              <a:rPr lang="en-US" dirty="0"/>
+              <a:t>: nota</a:t>
+            </a:r>
+          </a:p>
+          <a:p>
+            <a:r>
+              <a:rPr lang="en-US" dirty="0" err="1"/>
+              <a:t>Diferenta</a:t>
+            </a:r>
+            <a:r>
+              <a:rPr lang="en-US" dirty="0"/>
+              <a:t> </a:t>
+            </a:r>
+            <a:r>
+              <a:rPr lang="en-US" dirty="0" err="1"/>
+              <a:t>dintre</a:t>
+            </a:r>
+            <a:r>
+              <a:rPr lang="en-US" dirty="0"/>
+              <a:t> entity </a:t>
+            </a:r>
+            <a:r>
+              <a:rPr lang="en-US" dirty="0" err="1"/>
+              <a:t>si</a:t>
+            </a:r>
+            <a:r>
+              <a:rPr lang="en-US" dirty="0"/>
+              <a:t> value object: </a:t>
+            </a:r>
+            <a:r>
+              <a:rPr lang="en-US" dirty="0">
+                <a:hlinkClick r:id="rId3"/>
+              </a:rPr>
+              <a:t>https://enterprisecraftsmanship.com/posts/entity-vs-value-object-the-ultimate-list-of-differences/</a:t>
+            </a:r>
             <a:endParaRPr lang="en-US" dirty="0"/>
           </a:p>
           <a:p>
-            <a:r>
-              <a:rPr lang="en-US" dirty="0" err="1"/>
-              <a:t>Exemplu</a:t>
-            </a:r>
-            <a:r>
-              <a:rPr lang="en-US" dirty="0"/>
-              <a:t>: nota</a:t>
-            </a:r>
+            <a:pPr marL="0" indent="0">
+              <a:buNone/>
+            </a:pPr>
+            <a:endParaRPr lang="en-US" dirty="0"/>
           </a:p>
           <a:p>
             <a:endParaRPr lang="en-US" dirty="0"/>

</xml_diff>